<commit_message>
New slide were added to presentation
</commit_message>
<xml_diff>
--- a/presentation.pptx
+++ b/presentation.pptx
@@ -10,8 +10,9 @@
     <p:sldId id="258" r:id="rId4"/>
     <p:sldId id="259" r:id="rId5"/>
     <p:sldId id="260" r:id="rId6"/>
-    <p:sldId id="261" r:id="rId7"/>
-    <p:sldId id="262" r:id="rId8"/>
+    <p:sldId id="263" r:id="rId7"/>
+    <p:sldId id="261" r:id="rId8"/>
+    <p:sldId id="262" r:id="rId9"/>
   </p:sldIdLst>
   <p:sldSz cx="12192000" cy="6858000"/>
   <p:notesSz cx="6858000" cy="9144000"/>
@@ -179,7 +180,7 @@
           <a:noFill/>
           <a:extLst>
             <a:ext uri="{909E8E84-426E-40dd-AFC4-6F175D3DCCD1}">
-              <a14:hiddenFill xmlns:a14="http://schemas.microsoft.com/office/drawing/2010/main" xmlns="">
+              <a14:hiddenFill xmlns="" xmlns:a14="http://schemas.microsoft.com/office/drawing/2010/main">
                 <a:solidFill>
                   <a:srgbClr val="FFFFFF"/>
                 </a:solidFill>
@@ -239,7 +240,7 @@
             </a:ln>
             <a:extLst>
               <a:ext uri="{91240B29-F687-4f45-9708-019B960494DF}">
-                <a14:hiddenLine xmlns:a14="http://schemas.microsoft.com/office/drawing/2010/main" xmlns="" w="9525">
+                <a14:hiddenLine xmlns="" xmlns:a14="http://schemas.microsoft.com/office/drawing/2010/main" w="9525">
                   <a:solidFill>
                     <a:srgbClr val="000000"/>
                   </a:solidFill>
@@ -329,7 +330,7 @@
             </a:ln>
             <a:extLst>
               <a:ext uri="{91240B29-F687-4f45-9708-019B960494DF}">
-                <a14:hiddenLine xmlns:a14="http://schemas.microsoft.com/office/drawing/2010/main" xmlns="" w="9525">
+                <a14:hiddenLine xmlns="" xmlns:a14="http://schemas.microsoft.com/office/drawing/2010/main" w="9525">
                   <a:solidFill>
                     <a:srgbClr val="000000"/>
                   </a:solidFill>
@@ -419,7 +420,7 @@
             </a:ln>
             <a:extLst>
               <a:ext uri="{91240B29-F687-4f45-9708-019B960494DF}">
-                <a14:hiddenLine xmlns:a14="http://schemas.microsoft.com/office/drawing/2010/main" xmlns="" w="9525">
+                <a14:hiddenLine xmlns="" xmlns:a14="http://schemas.microsoft.com/office/drawing/2010/main" w="9525">
                   <a:solidFill>
                     <a:srgbClr val="000000"/>
                   </a:solidFill>
@@ -453,7 +454,7 @@
             </a:ln>
             <a:extLst>
               <a:ext uri="{91240B29-F687-4f45-9708-019B960494DF}">
-                <a14:hiddenLine xmlns:a14="http://schemas.microsoft.com/office/drawing/2010/main" xmlns="" w="9525">
+                <a14:hiddenLine xmlns="" xmlns:a14="http://schemas.microsoft.com/office/drawing/2010/main" w="9525">
                   <a:solidFill>
                     <a:srgbClr val="000000"/>
                   </a:solidFill>
@@ -543,7 +544,7 @@
             </a:ln>
             <a:extLst>
               <a:ext uri="{91240B29-F687-4f45-9708-019B960494DF}">
-                <a14:hiddenLine xmlns:a14="http://schemas.microsoft.com/office/drawing/2010/main" xmlns="" w="9525">
+                <a14:hiddenLine xmlns="" xmlns:a14="http://schemas.microsoft.com/office/drawing/2010/main" w="9525">
                   <a:solidFill>
                     <a:srgbClr val="000000"/>
                   </a:solidFill>
@@ -605,7 +606,7 @@
             </a:ln>
             <a:extLst>
               <a:ext uri="{91240B29-F687-4f45-9708-019B960494DF}">
-                <a14:hiddenLine xmlns:a14="http://schemas.microsoft.com/office/drawing/2010/main" xmlns="" w="9525">
+                <a14:hiddenLine xmlns="" xmlns:a14="http://schemas.microsoft.com/office/drawing/2010/main" w="9525">
                   <a:solidFill>
                     <a:srgbClr val="000000"/>
                   </a:solidFill>
@@ -667,7 +668,7 @@
             </a:ln>
             <a:extLst>
               <a:ext uri="{91240B29-F687-4f45-9708-019B960494DF}">
-                <a14:hiddenLine xmlns:a14="http://schemas.microsoft.com/office/drawing/2010/main" xmlns="" w="9525">
+                <a14:hiddenLine xmlns="" xmlns:a14="http://schemas.microsoft.com/office/drawing/2010/main" w="9525">
                   <a:solidFill>
                     <a:srgbClr val="000000"/>
                   </a:solidFill>
@@ -757,7 +758,7 @@
             </a:ln>
             <a:extLst>
               <a:ext uri="{91240B29-F687-4f45-9708-019B960494DF}">
-                <a14:hiddenLine xmlns:a14="http://schemas.microsoft.com/office/drawing/2010/main" xmlns="" w="9525">
+                <a14:hiddenLine xmlns="" xmlns:a14="http://schemas.microsoft.com/office/drawing/2010/main" w="9525">
                   <a:solidFill>
                     <a:srgbClr val="000000"/>
                   </a:solidFill>
@@ -819,7 +820,7 @@
             </a:ln>
             <a:extLst>
               <a:ext uri="{91240B29-F687-4f45-9708-019B960494DF}">
-                <a14:hiddenLine xmlns:a14="http://schemas.microsoft.com/office/drawing/2010/main" xmlns="" w="9525">
+                <a14:hiddenLine xmlns="" xmlns:a14="http://schemas.microsoft.com/office/drawing/2010/main" w="9525">
                   <a:solidFill>
                     <a:srgbClr val="000000"/>
                   </a:solidFill>
@@ -881,7 +882,7 @@
             </a:ln>
             <a:extLst>
               <a:ext uri="{91240B29-F687-4f45-9708-019B960494DF}">
-                <a14:hiddenLine xmlns:a14="http://schemas.microsoft.com/office/drawing/2010/main" xmlns="" w="9525">
+                <a14:hiddenLine xmlns="" xmlns:a14="http://schemas.microsoft.com/office/drawing/2010/main" w="9525">
                   <a:solidFill>
                     <a:srgbClr val="000000"/>
                   </a:solidFill>
@@ -971,7 +972,7 @@
             </a:ln>
             <a:extLst>
               <a:ext uri="{91240B29-F687-4f45-9708-019B960494DF}">
-                <a14:hiddenLine xmlns:a14="http://schemas.microsoft.com/office/drawing/2010/main" xmlns="" w="9525">
+                <a14:hiddenLine xmlns="" xmlns:a14="http://schemas.microsoft.com/office/drawing/2010/main" w="9525">
                   <a:solidFill>
                     <a:srgbClr val="000000"/>
                   </a:solidFill>
@@ -1061,7 +1062,7 @@
             </a:ln>
             <a:extLst>
               <a:ext uri="{91240B29-F687-4f45-9708-019B960494DF}">
-                <a14:hiddenLine xmlns:a14="http://schemas.microsoft.com/office/drawing/2010/main" xmlns="" w="9525">
+                <a14:hiddenLine xmlns="" xmlns:a14="http://schemas.microsoft.com/office/drawing/2010/main" w="9525">
                   <a:solidFill>
                     <a:srgbClr val="000000"/>
                   </a:solidFill>
@@ -1123,7 +1124,7 @@
             </a:ln>
             <a:extLst>
               <a:ext uri="{91240B29-F687-4f45-9708-019B960494DF}">
-                <a14:hiddenLine xmlns:a14="http://schemas.microsoft.com/office/drawing/2010/main" xmlns="" w="9525">
+                <a14:hiddenLine xmlns="" xmlns:a14="http://schemas.microsoft.com/office/drawing/2010/main" w="9525">
                   <a:solidFill>
                     <a:srgbClr val="000000"/>
                   </a:solidFill>
@@ -1233,7 +1234,7 @@
             </a:ln>
             <a:extLst>
               <a:ext uri="{91240B29-F687-4f45-9708-019B960494DF}">
-                <a14:hiddenLine xmlns:a14="http://schemas.microsoft.com/office/drawing/2010/main" xmlns="" w="9525">
+                <a14:hiddenLine xmlns="" xmlns:a14="http://schemas.microsoft.com/office/drawing/2010/main" w="9525">
                   <a:solidFill>
                     <a:srgbClr val="000000"/>
                   </a:solidFill>
@@ -1295,7 +1296,7 @@
             </a:ln>
             <a:extLst>
               <a:ext uri="{91240B29-F687-4f45-9708-019B960494DF}">
-                <a14:hiddenLine xmlns:a14="http://schemas.microsoft.com/office/drawing/2010/main" xmlns="" w="9525">
+                <a14:hiddenLine xmlns="" xmlns:a14="http://schemas.microsoft.com/office/drawing/2010/main" w="9525">
                   <a:solidFill>
                     <a:srgbClr val="000000"/>
                   </a:solidFill>
@@ -1385,7 +1386,7 @@
             </a:ln>
             <a:extLst>
               <a:ext uri="{91240B29-F687-4f45-9708-019B960494DF}">
-                <a14:hiddenLine xmlns:a14="http://schemas.microsoft.com/office/drawing/2010/main" xmlns="" w="9525">
+                <a14:hiddenLine xmlns="" xmlns:a14="http://schemas.microsoft.com/office/drawing/2010/main" w="9525">
                   <a:solidFill>
                     <a:srgbClr val="000000"/>
                   </a:solidFill>
@@ -1475,7 +1476,7 @@
             </a:ln>
             <a:extLst>
               <a:ext uri="{91240B29-F687-4f45-9708-019B960494DF}">
-                <a14:hiddenLine xmlns:a14="http://schemas.microsoft.com/office/drawing/2010/main" xmlns="" w="9525">
+                <a14:hiddenLine xmlns="" xmlns:a14="http://schemas.microsoft.com/office/drawing/2010/main" w="9525">
                   <a:solidFill>
                     <a:srgbClr val="000000"/>
                   </a:solidFill>
@@ -1537,7 +1538,7 @@
             </a:ln>
             <a:extLst>
               <a:ext uri="{91240B29-F687-4f45-9708-019B960494DF}">
-                <a14:hiddenLine xmlns:a14="http://schemas.microsoft.com/office/drawing/2010/main" xmlns="" w="9525">
+                <a14:hiddenLine xmlns="" xmlns:a14="http://schemas.microsoft.com/office/drawing/2010/main" w="9525">
                   <a:solidFill>
                     <a:srgbClr val="000000"/>
                   </a:solidFill>
@@ -1627,7 +1628,7 @@
             </a:ln>
             <a:extLst>
               <a:ext uri="{91240B29-F687-4f45-9708-019B960494DF}">
-                <a14:hiddenLine xmlns:a14="http://schemas.microsoft.com/office/drawing/2010/main" xmlns="" w="9525">
+                <a14:hiddenLine xmlns="" xmlns:a14="http://schemas.microsoft.com/office/drawing/2010/main" w="9525">
                   <a:solidFill>
                     <a:srgbClr val="000000"/>
                   </a:solidFill>
@@ -1717,7 +1718,7 @@
             </a:ln>
             <a:extLst>
               <a:ext uri="{91240B29-F687-4f45-9708-019B960494DF}">
-                <a14:hiddenLine xmlns:a14="http://schemas.microsoft.com/office/drawing/2010/main" xmlns="" w="9525">
+                <a14:hiddenLine xmlns="" xmlns:a14="http://schemas.microsoft.com/office/drawing/2010/main" w="9525">
                   <a:solidFill>
                     <a:srgbClr val="000000"/>
                   </a:solidFill>
@@ -1773,7 +1774,7 @@
             </a:ln>
             <a:extLst>
               <a:ext uri="{91240B29-F687-4f45-9708-019B960494DF}">
-                <a14:hiddenLine xmlns:a14="http://schemas.microsoft.com/office/drawing/2010/main" xmlns="" w="9525">
+                <a14:hiddenLine xmlns="" xmlns:a14="http://schemas.microsoft.com/office/drawing/2010/main" w="9525">
                   <a:solidFill>
                     <a:srgbClr val="000000"/>
                   </a:solidFill>
@@ -1863,7 +1864,7 @@
             </a:ln>
             <a:extLst>
               <a:ext uri="{91240B29-F687-4f45-9708-019B960494DF}">
-                <a14:hiddenLine xmlns:a14="http://schemas.microsoft.com/office/drawing/2010/main" xmlns="" w="9525">
+                <a14:hiddenLine xmlns="" xmlns:a14="http://schemas.microsoft.com/office/drawing/2010/main" w="9525">
                   <a:solidFill>
                     <a:srgbClr val="000000"/>
                   </a:solidFill>
@@ -1919,7 +1920,7 @@
             </a:ln>
             <a:extLst>
               <a:ext uri="{91240B29-F687-4f45-9708-019B960494DF}">
-                <a14:hiddenLine xmlns:a14="http://schemas.microsoft.com/office/drawing/2010/main" xmlns="" w="9525">
+                <a14:hiddenLine xmlns="" xmlns:a14="http://schemas.microsoft.com/office/drawing/2010/main" w="9525">
                   <a:solidFill>
                     <a:srgbClr val="000000"/>
                   </a:solidFill>
@@ -2009,7 +2010,7 @@
             </a:ln>
             <a:extLst>
               <a:ext uri="{91240B29-F687-4f45-9708-019B960494DF}">
-                <a14:hiddenLine xmlns:a14="http://schemas.microsoft.com/office/drawing/2010/main" xmlns="" w="9525">
+                <a14:hiddenLine xmlns="" xmlns:a14="http://schemas.microsoft.com/office/drawing/2010/main" w="9525">
                   <a:solidFill>
                     <a:srgbClr val="000000"/>
                   </a:solidFill>
@@ -2077,7 +2078,7 @@
             </a:ln>
             <a:extLst>
               <a:ext uri="{91240B29-F687-4f45-9708-019B960494DF}">
-                <a14:hiddenLine xmlns:a14="http://schemas.microsoft.com/office/drawing/2010/main" xmlns="" w="9525">
+                <a14:hiddenLine xmlns="" xmlns:a14="http://schemas.microsoft.com/office/drawing/2010/main" w="9525">
                   <a:solidFill>
                     <a:srgbClr val="000000"/>
                   </a:solidFill>
@@ -2167,7 +2168,7 @@
             </a:ln>
             <a:extLst>
               <a:ext uri="{91240B29-F687-4f45-9708-019B960494DF}">
-                <a14:hiddenLine xmlns:a14="http://schemas.microsoft.com/office/drawing/2010/main" xmlns="" w="9525">
+                <a14:hiddenLine xmlns="" xmlns:a14="http://schemas.microsoft.com/office/drawing/2010/main" w="9525">
                   <a:solidFill>
                     <a:srgbClr val="000000"/>
                   </a:solidFill>
@@ -2235,7 +2236,7 @@
             </a:ln>
             <a:extLst>
               <a:ext uri="{91240B29-F687-4f45-9708-019B960494DF}">
-                <a14:hiddenLine xmlns:a14="http://schemas.microsoft.com/office/drawing/2010/main" xmlns="" w="9525">
+                <a14:hiddenLine xmlns="" xmlns:a14="http://schemas.microsoft.com/office/drawing/2010/main" w="9525">
                   <a:solidFill>
                     <a:srgbClr val="000000"/>
                   </a:solidFill>
@@ -2325,7 +2326,7 @@
             </a:ln>
             <a:extLst>
               <a:ext uri="{91240B29-F687-4f45-9708-019B960494DF}">
-                <a14:hiddenLine xmlns:a14="http://schemas.microsoft.com/office/drawing/2010/main" xmlns="" w="9525">
+                <a14:hiddenLine xmlns="" xmlns:a14="http://schemas.microsoft.com/office/drawing/2010/main" w="9525">
                   <a:solidFill>
                     <a:srgbClr val="000000"/>
                   </a:solidFill>
@@ -2359,7 +2360,7 @@
             </a:ln>
             <a:extLst>
               <a:ext uri="{91240B29-F687-4f45-9708-019B960494DF}">
-                <a14:hiddenLine xmlns:a14="http://schemas.microsoft.com/office/drawing/2010/main" xmlns="" w="9525">
+                <a14:hiddenLine xmlns="" xmlns:a14="http://schemas.microsoft.com/office/drawing/2010/main" w="9525">
                   <a:solidFill>
                     <a:srgbClr val="000000"/>
                   </a:solidFill>
@@ -2449,7 +2450,7 @@
             </a:ln>
             <a:extLst>
               <a:ext uri="{91240B29-F687-4f45-9708-019B960494DF}">
-                <a14:hiddenLine xmlns:a14="http://schemas.microsoft.com/office/drawing/2010/main" xmlns="" w="9525">
+                <a14:hiddenLine xmlns="" xmlns:a14="http://schemas.microsoft.com/office/drawing/2010/main" w="9525">
                   <a:solidFill>
                     <a:srgbClr val="000000"/>
                   </a:solidFill>
@@ -2511,7 +2512,7 @@
             </a:ln>
             <a:extLst>
               <a:ext uri="{91240B29-F687-4f45-9708-019B960494DF}">
-                <a14:hiddenLine xmlns:a14="http://schemas.microsoft.com/office/drawing/2010/main" xmlns="" w="9525">
+                <a14:hiddenLine xmlns="" xmlns:a14="http://schemas.microsoft.com/office/drawing/2010/main" w="9525">
                   <a:solidFill>
                     <a:srgbClr val="000000"/>
                   </a:solidFill>
@@ -2573,7 +2574,7 @@
             </a:ln>
             <a:extLst>
               <a:ext uri="{91240B29-F687-4f45-9708-019B960494DF}">
-                <a14:hiddenLine xmlns:a14="http://schemas.microsoft.com/office/drawing/2010/main" xmlns="" w="9525">
+                <a14:hiddenLine xmlns="" xmlns:a14="http://schemas.microsoft.com/office/drawing/2010/main" w="9525">
                   <a:solidFill>
                     <a:srgbClr val="000000"/>
                   </a:solidFill>
@@ -2663,7 +2664,7 @@
             </a:ln>
             <a:extLst>
               <a:ext uri="{91240B29-F687-4f45-9708-019B960494DF}">
-                <a14:hiddenLine xmlns:a14="http://schemas.microsoft.com/office/drawing/2010/main" xmlns="" w="9525">
+                <a14:hiddenLine xmlns="" xmlns:a14="http://schemas.microsoft.com/office/drawing/2010/main" w="9525">
                   <a:solidFill>
                     <a:srgbClr val="000000"/>
                   </a:solidFill>
@@ -2731,7 +2732,7 @@
             </a:ln>
             <a:extLst>
               <a:ext uri="{91240B29-F687-4f45-9708-019B960494DF}">
-                <a14:hiddenLine xmlns:a14="http://schemas.microsoft.com/office/drawing/2010/main" xmlns="" w="9525">
+                <a14:hiddenLine xmlns="" xmlns:a14="http://schemas.microsoft.com/office/drawing/2010/main" w="9525">
                   <a:solidFill>
                     <a:srgbClr val="000000"/>
                   </a:solidFill>
@@ -2793,7 +2794,7 @@
             </a:ln>
             <a:extLst>
               <a:ext uri="{91240B29-F687-4f45-9708-019B960494DF}">
-                <a14:hiddenLine xmlns:a14="http://schemas.microsoft.com/office/drawing/2010/main" xmlns="" w="9525">
+                <a14:hiddenLine xmlns="" xmlns:a14="http://schemas.microsoft.com/office/drawing/2010/main" w="9525">
                   <a:solidFill>
                     <a:srgbClr val="000000"/>
                   </a:solidFill>
@@ -2883,7 +2884,7 @@
             </a:ln>
             <a:extLst>
               <a:ext uri="{91240B29-F687-4f45-9708-019B960494DF}">
-                <a14:hiddenLine xmlns:a14="http://schemas.microsoft.com/office/drawing/2010/main" xmlns="" w="9525">
+                <a14:hiddenLine xmlns="" xmlns:a14="http://schemas.microsoft.com/office/drawing/2010/main" w="9525">
                   <a:solidFill>
                     <a:srgbClr val="000000"/>
                   </a:solidFill>
@@ -2945,7 +2946,7 @@
             </a:ln>
             <a:extLst>
               <a:ext uri="{91240B29-F687-4f45-9708-019B960494DF}">
-                <a14:hiddenLine xmlns:a14="http://schemas.microsoft.com/office/drawing/2010/main" xmlns="" w="9525">
+                <a14:hiddenLine xmlns="" xmlns:a14="http://schemas.microsoft.com/office/drawing/2010/main" w="9525">
                   <a:solidFill>
                     <a:srgbClr val="000000"/>
                   </a:solidFill>
@@ -3035,7 +3036,7 @@
             </a:ln>
             <a:extLst>
               <a:ext uri="{91240B29-F687-4f45-9708-019B960494DF}">
-                <a14:hiddenLine xmlns:a14="http://schemas.microsoft.com/office/drawing/2010/main" xmlns="" w="9525">
+                <a14:hiddenLine xmlns="" xmlns:a14="http://schemas.microsoft.com/office/drawing/2010/main" w="9525">
                   <a:solidFill>
                     <a:srgbClr val="000000"/>
                   </a:solidFill>
@@ -3097,7 +3098,7 @@
             </a:ln>
             <a:extLst>
               <a:ext uri="{91240B29-F687-4f45-9708-019B960494DF}">
-                <a14:hiddenLine xmlns:a14="http://schemas.microsoft.com/office/drawing/2010/main" xmlns="" w="9525">
+                <a14:hiddenLine xmlns="" xmlns:a14="http://schemas.microsoft.com/office/drawing/2010/main" w="9525">
                   <a:solidFill>
                     <a:srgbClr val="000000"/>
                   </a:solidFill>
@@ -3187,7 +3188,7 @@
             </a:ln>
             <a:extLst>
               <a:ext uri="{91240B29-F687-4f45-9708-019B960494DF}">
-                <a14:hiddenLine xmlns:a14="http://schemas.microsoft.com/office/drawing/2010/main" xmlns="" w="9525">
+                <a14:hiddenLine xmlns="" xmlns:a14="http://schemas.microsoft.com/office/drawing/2010/main" w="9525">
                   <a:solidFill>
                     <a:srgbClr val="000000"/>
                   </a:solidFill>
@@ -3221,7 +3222,7 @@
             </a:ln>
             <a:extLst>
               <a:ext uri="{91240B29-F687-4f45-9708-019B960494DF}">
-                <a14:hiddenLine xmlns:a14="http://schemas.microsoft.com/office/drawing/2010/main" xmlns="" w="9525">
+                <a14:hiddenLine xmlns="" xmlns:a14="http://schemas.microsoft.com/office/drawing/2010/main" w="9525">
                   <a:solidFill>
                     <a:srgbClr val="000000"/>
                   </a:solidFill>
@@ -3286,7 +3287,7 @@
             </a:ln>
             <a:extLst>
               <a:ext uri="{91240B29-F687-4f45-9708-019B960494DF}">
-                <a14:hiddenLine xmlns:a14="http://schemas.microsoft.com/office/drawing/2010/main" xmlns="" w="9525">
+                <a14:hiddenLine xmlns="" xmlns:a14="http://schemas.microsoft.com/office/drawing/2010/main" w="9525">
                   <a:solidFill>
                     <a:srgbClr val="000000"/>
                   </a:solidFill>
@@ -3376,7 +3377,7 @@
             </a:ln>
             <a:extLst>
               <a:ext uri="{91240B29-F687-4f45-9708-019B960494DF}">
-                <a14:hiddenLine xmlns:a14="http://schemas.microsoft.com/office/drawing/2010/main" xmlns="" w="9525">
+                <a14:hiddenLine xmlns="" xmlns:a14="http://schemas.microsoft.com/office/drawing/2010/main" w="9525">
                   <a:solidFill>
                     <a:srgbClr val="000000"/>
                   </a:solidFill>
@@ -3438,7 +3439,7 @@
             </a:ln>
             <a:extLst>
               <a:ext uri="{91240B29-F687-4f45-9708-019B960494DF}">
-                <a14:hiddenLine xmlns:a14="http://schemas.microsoft.com/office/drawing/2010/main" xmlns="" w="9525">
+                <a14:hiddenLine xmlns="" xmlns:a14="http://schemas.microsoft.com/office/drawing/2010/main" w="9525">
                   <a:solidFill>
                     <a:srgbClr val="000000"/>
                   </a:solidFill>
@@ -3528,7 +3529,7 @@
             </a:ln>
             <a:extLst>
               <a:ext uri="{91240B29-F687-4f45-9708-019B960494DF}">
-                <a14:hiddenLine xmlns:a14="http://schemas.microsoft.com/office/drawing/2010/main" xmlns="" w="9525">
+                <a14:hiddenLine xmlns="" xmlns:a14="http://schemas.microsoft.com/office/drawing/2010/main" w="9525">
                   <a:solidFill>
                     <a:srgbClr val="000000"/>
                   </a:solidFill>
@@ -3618,7 +3619,7 @@
             </a:ln>
             <a:extLst>
               <a:ext uri="{91240B29-F687-4f45-9708-019B960494DF}">
-                <a14:hiddenLine xmlns:a14="http://schemas.microsoft.com/office/drawing/2010/main" xmlns="" w="9525">
+                <a14:hiddenLine xmlns="" xmlns:a14="http://schemas.microsoft.com/office/drawing/2010/main" w="9525">
                   <a:solidFill>
                     <a:srgbClr val="000000"/>
                   </a:solidFill>
@@ -3683,7 +3684,7 @@
             </a:ln>
             <a:extLst>
               <a:ext uri="{91240B29-F687-4f45-9708-019B960494DF}">
-                <a14:hiddenLine xmlns:a14="http://schemas.microsoft.com/office/drawing/2010/main" xmlns="" w="9525">
+                <a14:hiddenLine xmlns="" xmlns:a14="http://schemas.microsoft.com/office/drawing/2010/main" w="9525">
                   <a:solidFill>
                     <a:srgbClr val="000000"/>
                   </a:solidFill>
@@ -3745,7 +3746,7 @@
             </a:ln>
             <a:extLst>
               <a:ext uri="{91240B29-F687-4f45-9708-019B960494DF}">
-                <a14:hiddenLine xmlns:a14="http://schemas.microsoft.com/office/drawing/2010/main" xmlns="" w="9525">
+                <a14:hiddenLine xmlns="" xmlns:a14="http://schemas.microsoft.com/office/drawing/2010/main" w="9525">
                   <a:solidFill>
                     <a:srgbClr val="000000"/>
                   </a:solidFill>
@@ -3835,7 +3836,7 @@
             </a:ln>
             <a:extLst>
               <a:ext uri="{91240B29-F687-4f45-9708-019B960494DF}">
-                <a14:hiddenLine xmlns:a14="http://schemas.microsoft.com/office/drawing/2010/main" xmlns="" w="9525">
+                <a14:hiddenLine xmlns="" xmlns:a14="http://schemas.microsoft.com/office/drawing/2010/main" w="9525">
                   <a:solidFill>
                     <a:srgbClr val="000000"/>
                   </a:solidFill>
@@ -3925,7 +3926,7 @@
             </a:ln>
             <a:extLst>
               <a:ext uri="{91240B29-F687-4f45-9708-019B960494DF}">
-                <a14:hiddenLine xmlns:a14="http://schemas.microsoft.com/office/drawing/2010/main" xmlns="" w="9525">
+                <a14:hiddenLine xmlns="" xmlns:a14="http://schemas.microsoft.com/office/drawing/2010/main" w="9525">
                   <a:solidFill>
                     <a:srgbClr val="000000"/>
                   </a:solidFill>
@@ -3987,7 +3988,7 @@
             </a:ln>
             <a:extLst>
               <a:ext uri="{91240B29-F687-4f45-9708-019B960494DF}">
-                <a14:hiddenLine xmlns:a14="http://schemas.microsoft.com/office/drawing/2010/main" xmlns="" w="9525">
+                <a14:hiddenLine xmlns="" xmlns:a14="http://schemas.microsoft.com/office/drawing/2010/main" w="9525">
                   <a:solidFill>
                     <a:srgbClr val="000000"/>
                   </a:solidFill>
@@ -4107,7 +4108,7 @@
             </a:ln>
             <a:extLst>
               <a:ext uri="{91240B29-F687-4f45-9708-019B960494DF}">
-                <a14:hiddenLine xmlns:a14="http://schemas.microsoft.com/office/drawing/2010/main" xmlns="" w="9525">
+                <a14:hiddenLine xmlns="" xmlns:a14="http://schemas.microsoft.com/office/drawing/2010/main" w="9525">
                   <a:solidFill>
                     <a:srgbClr val="000000"/>
                   </a:solidFill>
@@ -4175,7 +4176,7 @@
             </a:ln>
             <a:extLst>
               <a:ext uri="{91240B29-F687-4f45-9708-019B960494DF}">
-                <a14:hiddenLine xmlns:a14="http://schemas.microsoft.com/office/drawing/2010/main" xmlns="" w="9525">
+                <a14:hiddenLine xmlns="" xmlns:a14="http://schemas.microsoft.com/office/drawing/2010/main" w="9525">
                   <a:solidFill>
                     <a:srgbClr val="000000"/>
                   </a:solidFill>
@@ -4265,7 +4266,7 @@
             </a:ln>
             <a:extLst>
               <a:ext uri="{91240B29-F687-4f45-9708-019B960494DF}">
-                <a14:hiddenLine xmlns:a14="http://schemas.microsoft.com/office/drawing/2010/main" xmlns="" w="9525">
+                <a14:hiddenLine xmlns="" xmlns:a14="http://schemas.microsoft.com/office/drawing/2010/main" w="9525">
                   <a:solidFill>
                     <a:srgbClr val="000000"/>
                   </a:solidFill>
@@ -4405,7 +4406,7 @@
           <a:p>
             <a:fld id="{48A87A34-81AB-432B-8DAE-1953F412C126}" type="datetimeFigureOut">
               <a:rPr lang="en-US" dirty="0"/>
-              <a:t>2/22/2022</a:t>
+              <a:t>3/21/2022</a:t>
             </a:fld>
             <a:endParaRPr lang="en-US" dirty="0"/>
           </a:p>
@@ -4667,7 +4668,7 @@
           <a:p>
             <a:fld id="{48A87A34-81AB-432B-8DAE-1953F412C126}" type="datetimeFigureOut">
               <a:rPr lang="en-US" dirty="0"/>
-              <a:t>2/22/2022</a:t>
+              <a:t>3/21/2022</a:t>
             </a:fld>
             <a:endParaRPr lang="en-US" dirty="0"/>
           </a:p>
@@ -4858,7 +4859,7 @@
           <a:p>
             <a:fld id="{48A87A34-81AB-432B-8DAE-1953F412C126}" type="datetimeFigureOut">
               <a:rPr lang="en-US" dirty="0"/>
-              <a:t>2/22/2022</a:t>
+              <a:t>3/21/2022</a:t>
             </a:fld>
             <a:endParaRPr lang="en-US" dirty="0"/>
           </a:p>
@@ -5116,7 +5117,7 @@
           <a:p>
             <a:fld id="{48A87A34-81AB-432B-8DAE-1953F412C126}" type="datetimeFigureOut">
               <a:rPr lang="en-US" dirty="0"/>
-              <a:t>2/22/2022</a:t>
+              <a:t>3/21/2022</a:t>
             </a:fld>
             <a:endParaRPr lang="en-US" dirty="0"/>
           </a:p>
@@ -5545,7 +5546,7 @@
           <a:p>
             <a:fld id="{48A87A34-81AB-432B-8DAE-1953F412C126}" type="datetimeFigureOut">
               <a:rPr lang="en-US" dirty="0"/>
-              <a:t>2/22/2022</a:t>
+              <a:t>3/21/2022</a:t>
             </a:fld>
             <a:endParaRPr lang="en-US" dirty="0"/>
           </a:p>
@@ -6086,7 +6087,7 @@
           <a:p>
             <a:fld id="{48A87A34-81AB-432B-8DAE-1953F412C126}" type="datetimeFigureOut">
               <a:rPr lang="en-US" dirty="0"/>
-              <a:t>2/22/2022</a:t>
+              <a:t>3/21/2022</a:t>
             </a:fld>
             <a:endParaRPr lang="en-US" dirty="0"/>
           </a:p>
@@ -6801,7 +6802,7 @@
           <a:p>
             <a:fld id="{48A87A34-81AB-432B-8DAE-1953F412C126}" type="datetimeFigureOut">
               <a:rPr lang="en-US" dirty="0"/>
-              <a:t>2/22/2022</a:t>
+              <a:t>3/21/2022</a:t>
             </a:fld>
             <a:endParaRPr lang="en-US" dirty="0"/>
           </a:p>
@@ -6966,7 +6967,7 @@
           <a:p>
             <a:fld id="{48A87A34-81AB-432B-8DAE-1953F412C126}" type="datetimeFigureOut">
               <a:rPr lang="en-US" dirty="0"/>
-              <a:t>2/22/2022</a:t>
+              <a:t>3/21/2022</a:t>
             </a:fld>
             <a:endParaRPr lang="en-US" dirty="0"/>
           </a:p>
@@ -7141,7 +7142,7 @@
           <a:p>
             <a:fld id="{48A87A34-81AB-432B-8DAE-1953F412C126}" type="datetimeFigureOut">
               <a:rPr lang="en-US" dirty="0"/>
-              <a:t>2/22/2022</a:t>
+              <a:t>3/21/2022</a:t>
             </a:fld>
             <a:endParaRPr lang="en-US" dirty="0"/>
           </a:p>
@@ -7306,7 +7307,7 @@
           <a:p>
             <a:fld id="{48A87A34-81AB-432B-8DAE-1953F412C126}" type="datetimeFigureOut">
               <a:rPr lang="en-US" dirty="0"/>
-              <a:t>2/22/2022</a:t>
+              <a:t>3/21/2022</a:t>
             </a:fld>
             <a:endParaRPr lang="en-US" dirty="0"/>
           </a:p>
@@ -7551,7 +7552,7 @@
           <a:p>
             <a:fld id="{48A87A34-81AB-432B-8DAE-1953F412C126}" type="datetimeFigureOut">
               <a:rPr lang="en-US" dirty="0"/>
-              <a:t>2/22/2022</a:t>
+              <a:t>3/21/2022</a:t>
             </a:fld>
             <a:endParaRPr lang="en-US" dirty="0"/>
           </a:p>
@@ -7778,7 +7779,7 @@
           <a:p>
             <a:fld id="{48A87A34-81AB-432B-8DAE-1953F412C126}" type="datetimeFigureOut">
               <a:rPr lang="en-US" dirty="0"/>
-              <a:t>2/22/2022</a:t>
+              <a:t>3/21/2022</a:t>
             </a:fld>
             <a:endParaRPr lang="en-US" dirty="0"/>
           </a:p>
@@ -8154,7 +8155,7 @@
           <a:p>
             <a:fld id="{48A87A34-81AB-432B-8DAE-1953F412C126}" type="datetimeFigureOut">
               <a:rPr lang="en-US" dirty="0"/>
-              <a:t>2/22/2022</a:t>
+              <a:t>3/21/2022</a:t>
             </a:fld>
             <a:endParaRPr lang="en-US" dirty="0"/>
           </a:p>
@@ -8267,7 +8268,7 @@
           <a:p>
             <a:fld id="{48A87A34-81AB-432B-8DAE-1953F412C126}" type="datetimeFigureOut">
               <a:rPr lang="en-US" dirty="0"/>
-              <a:t>2/22/2022</a:t>
+              <a:t>3/21/2022</a:t>
             </a:fld>
             <a:endParaRPr lang="en-US" dirty="0"/>
           </a:p>
@@ -8357,7 +8358,7 @@
           <a:p>
             <a:fld id="{48A87A34-81AB-432B-8DAE-1953F412C126}" type="datetimeFigureOut">
               <a:rPr lang="en-US" dirty="0"/>
-              <a:t>2/22/2022</a:t>
+              <a:t>3/21/2022</a:t>
             </a:fld>
             <a:endParaRPr lang="en-US" dirty="0"/>
           </a:p>
@@ -8601,7 +8602,7 @@
           <a:p>
             <a:fld id="{48A87A34-81AB-432B-8DAE-1953F412C126}" type="datetimeFigureOut">
               <a:rPr lang="en-US" dirty="0"/>
-              <a:t>2/22/2022</a:t>
+              <a:t>3/21/2022</a:t>
             </a:fld>
             <a:endParaRPr lang="en-US" dirty="0"/>
           </a:p>
@@ -8876,7 +8877,7 @@
           <a:p>
             <a:fld id="{48A87A34-81AB-432B-8DAE-1953F412C126}" type="datetimeFigureOut">
               <a:rPr lang="en-US" dirty="0"/>
-              <a:t>2/22/2022</a:t>
+              <a:t>3/21/2022</a:t>
             </a:fld>
             <a:endParaRPr lang="en-US" dirty="0"/>
           </a:p>
@@ -8987,7 +8988,7 @@
           <a:noFill/>
           <a:extLst>
             <a:ext uri="{909E8E84-426E-40dd-AFC4-6F175D3DCCD1}">
-              <a14:hiddenFill xmlns:a14="http://schemas.microsoft.com/office/drawing/2010/main" xmlns="">
+              <a14:hiddenFill xmlns="" xmlns:a14="http://schemas.microsoft.com/office/drawing/2010/main">
                 <a:solidFill>
                   <a:srgbClr val="FFFFFF"/>
                 </a:solidFill>
@@ -9061,7 +9062,7 @@
               </a:ln>
               <a:extLst>
                 <a:ext uri="{91240B29-F687-4f45-9708-019B960494DF}">
-                  <a14:hiddenLine xmlns:a14="http://schemas.microsoft.com/office/drawing/2010/main" xmlns="" w="9525">
+                  <a14:hiddenLine xmlns="" xmlns:a14="http://schemas.microsoft.com/office/drawing/2010/main" w="9525">
                     <a:solidFill>
                       <a:srgbClr val="000000"/>
                     </a:solidFill>
@@ -9151,7 +9152,7 @@
               </a:ln>
               <a:extLst>
                 <a:ext uri="{91240B29-F687-4f45-9708-019B960494DF}">
-                  <a14:hiddenLine xmlns:a14="http://schemas.microsoft.com/office/drawing/2010/main" xmlns="" w="9525">
+                  <a14:hiddenLine xmlns="" xmlns:a14="http://schemas.microsoft.com/office/drawing/2010/main" w="9525">
                     <a:solidFill>
                       <a:srgbClr val="000000"/>
                     </a:solidFill>
@@ -9241,7 +9242,7 @@
               </a:ln>
               <a:extLst>
                 <a:ext uri="{91240B29-F687-4f45-9708-019B960494DF}">
-                  <a14:hiddenLine xmlns:a14="http://schemas.microsoft.com/office/drawing/2010/main" xmlns="" w="9525">
+                  <a14:hiddenLine xmlns="" xmlns:a14="http://schemas.microsoft.com/office/drawing/2010/main" w="9525">
                     <a:solidFill>
                       <a:srgbClr val="000000"/>
                     </a:solidFill>
@@ -9303,7 +9304,7 @@
               </a:ln>
               <a:extLst>
                 <a:ext uri="{91240B29-F687-4f45-9708-019B960494DF}">
-                  <a14:hiddenLine xmlns:a14="http://schemas.microsoft.com/office/drawing/2010/main" xmlns="" w="9525">
+                  <a14:hiddenLine xmlns="" xmlns:a14="http://schemas.microsoft.com/office/drawing/2010/main" w="9525">
                     <a:solidFill>
                       <a:srgbClr val="000000"/>
                     </a:solidFill>
@@ -9393,7 +9394,7 @@
               </a:ln>
               <a:extLst>
                 <a:ext uri="{91240B29-F687-4f45-9708-019B960494DF}">
-                  <a14:hiddenLine xmlns:a14="http://schemas.microsoft.com/office/drawing/2010/main" xmlns="" w="9525">
+                  <a14:hiddenLine xmlns="" xmlns:a14="http://schemas.microsoft.com/office/drawing/2010/main" w="9525">
                     <a:solidFill>
                       <a:srgbClr val="000000"/>
                     </a:solidFill>
@@ -9455,7 +9456,7 @@
               </a:ln>
               <a:extLst>
                 <a:ext uri="{91240B29-F687-4f45-9708-019B960494DF}">
-                  <a14:hiddenLine xmlns:a14="http://schemas.microsoft.com/office/drawing/2010/main" xmlns="" w="9525">
+                  <a14:hiddenLine xmlns="" xmlns:a14="http://schemas.microsoft.com/office/drawing/2010/main" w="9525">
                     <a:solidFill>
                       <a:srgbClr val="000000"/>
                     </a:solidFill>
@@ -9517,7 +9518,7 @@
               </a:ln>
               <a:extLst>
                 <a:ext uri="{91240B29-F687-4f45-9708-019B960494DF}">
-                  <a14:hiddenLine xmlns:a14="http://schemas.microsoft.com/office/drawing/2010/main" xmlns="" w="9525">
+                  <a14:hiddenLine xmlns="" xmlns:a14="http://schemas.microsoft.com/office/drawing/2010/main" w="9525">
                     <a:solidFill>
                       <a:srgbClr val="000000"/>
                     </a:solidFill>
@@ -9607,7 +9608,7 @@
               </a:ln>
               <a:extLst>
                 <a:ext uri="{91240B29-F687-4f45-9708-019B960494DF}">
-                  <a14:hiddenLine xmlns:a14="http://schemas.microsoft.com/office/drawing/2010/main" xmlns="" w="9525">
+                  <a14:hiddenLine xmlns="" xmlns:a14="http://schemas.microsoft.com/office/drawing/2010/main" w="9525">
                     <a:solidFill>
                       <a:srgbClr val="000000"/>
                     </a:solidFill>
@@ -9697,7 +9698,7 @@
               </a:ln>
               <a:extLst>
                 <a:ext uri="{91240B29-F687-4f45-9708-019B960494DF}">
-                  <a14:hiddenLine xmlns:a14="http://schemas.microsoft.com/office/drawing/2010/main" xmlns="" w="9525">
+                  <a14:hiddenLine xmlns="" xmlns:a14="http://schemas.microsoft.com/office/drawing/2010/main" w="9525">
                     <a:solidFill>
                       <a:srgbClr val="000000"/>
                     </a:solidFill>
@@ -9759,7 +9760,7 @@
               </a:ln>
               <a:extLst>
                 <a:ext uri="{91240B29-F687-4f45-9708-019B960494DF}">
-                  <a14:hiddenLine xmlns:a14="http://schemas.microsoft.com/office/drawing/2010/main" xmlns="" w="9525">
+                  <a14:hiddenLine xmlns="" xmlns:a14="http://schemas.microsoft.com/office/drawing/2010/main" w="9525">
                     <a:solidFill>
                       <a:srgbClr val="000000"/>
                     </a:solidFill>
@@ -9869,7 +9870,7 @@
               </a:ln>
               <a:extLst>
                 <a:ext uri="{91240B29-F687-4f45-9708-019B960494DF}">
-                  <a14:hiddenLine xmlns:a14="http://schemas.microsoft.com/office/drawing/2010/main" xmlns="" w="9525">
+                  <a14:hiddenLine xmlns="" xmlns:a14="http://schemas.microsoft.com/office/drawing/2010/main" w="9525">
                     <a:solidFill>
                       <a:srgbClr val="000000"/>
                     </a:solidFill>
@@ -9953,7 +9954,7 @@
               </a:ln>
               <a:extLst>
                 <a:ext uri="{91240B29-F687-4f45-9708-019B960494DF}">
-                  <a14:hiddenLine xmlns:a14="http://schemas.microsoft.com/office/drawing/2010/main" xmlns="" w="9525">
+                  <a14:hiddenLine xmlns="" xmlns:a14="http://schemas.microsoft.com/office/drawing/2010/main" w="9525">
                     <a:solidFill>
                       <a:srgbClr val="000000"/>
                     </a:solidFill>
@@ -10015,7 +10016,7 @@
               </a:ln>
               <a:extLst>
                 <a:ext uri="{91240B29-F687-4f45-9708-019B960494DF}">
-                  <a14:hiddenLine xmlns:a14="http://schemas.microsoft.com/office/drawing/2010/main" xmlns="" w="9525">
+                  <a14:hiddenLine xmlns="" xmlns:a14="http://schemas.microsoft.com/office/drawing/2010/main" w="9525">
                     <a:solidFill>
                       <a:srgbClr val="000000"/>
                     </a:solidFill>
@@ -10077,7 +10078,7 @@
               </a:ln>
               <a:extLst>
                 <a:ext uri="{91240B29-F687-4f45-9708-019B960494DF}">
-                  <a14:hiddenLine xmlns:a14="http://schemas.microsoft.com/office/drawing/2010/main" xmlns="" w="9525">
+                  <a14:hiddenLine xmlns="" xmlns:a14="http://schemas.microsoft.com/office/drawing/2010/main" w="9525">
                     <a:solidFill>
                       <a:srgbClr val="000000"/>
                     </a:solidFill>
@@ -10167,7 +10168,7 @@
               </a:ln>
               <a:extLst>
                 <a:ext uri="{91240B29-F687-4f45-9708-019B960494DF}">
-                  <a14:hiddenLine xmlns:a14="http://schemas.microsoft.com/office/drawing/2010/main" xmlns="" w="9525">
+                  <a14:hiddenLine xmlns="" xmlns:a14="http://schemas.microsoft.com/office/drawing/2010/main" w="9525">
                     <a:solidFill>
                       <a:srgbClr val="000000"/>
                     </a:solidFill>
@@ -10201,7 +10202,7 @@
               </a:ln>
               <a:extLst>
                 <a:ext uri="{91240B29-F687-4f45-9708-019B960494DF}">
-                  <a14:hiddenLine xmlns:a14="http://schemas.microsoft.com/office/drawing/2010/main" xmlns="" w="9525">
+                  <a14:hiddenLine xmlns="" xmlns:a14="http://schemas.microsoft.com/office/drawing/2010/main" w="9525">
                     <a:solidFill>
                       <a:srgbClr val="000000"/>
                     </a:solidFill>
@@ -10266,7 +10267,7 @@
               </a:ln>
               <a:extLst>
                 <a:ext uri="{91240B29-F687-4f45-9708-019B960494DF}">
-                  <a14:hiddenLine xmlns:a14="http://schemas.microsoft.com/office/drawing/2010/main" xmlns="" w="9525">
+                  <a14:hiddenLine xmlns="" xmlns:a14="http://schemas.microsoft.com/office/drawing/2010/main" w="9525">
                     <a:solidFill>
                       <a:srgbClr val="000000"/>
                     </a:solidFill>
@@ -10356,7 +10357,7 @@
               </a:ln>
               <a:extLst>
                 <a:ext uri="{91240B29-F687-4f45-9708-019B960494DF}">
-                  <a14:hiddenLine xmlns:a14="http://schemas.microsoft.com/office/drawing/2010/main" xmlns="" w="9525">
+                  <a14:hiddenLine xmlns="" xmlns:a14="http://schemas.microsoft.com/office/drawing/2010/main" w="9525">
                     <a:solidFill>
                       <a:srgbClr val="000000"/>
                     </a:solidFill>
@@ -10418,7 +10419,7 @@
               </a:ln>
               <a:extLst>
                 <a:ext uri="{91240B29-F687-4f45-9708-019B960494DF}">
-                  <a14:hiddenLine xmlns:a14="http://schemas.microsoft.com/office/drawing/2010/main" xmlns="" w="9525">
+                  <a14:hiddenLine xmlns="" xmlns:a14="http://schemas.microsoft.com/office/drawing/2010/main" w="9525">
                     <a:solidFill>
                       <a:srgbClr val="000000"/>
                     </a:solidFill>
@@ -10508,7 +10509,7 @@
               </a:ln>
               <a:extLst>
                 <a:ext uri="{91240B29-F687-4f45-9708-019B960494DF}">
-                  <a14:hiddenLine xmlns:a14="http://schemas.microsoft.com/office/drawing/2010/main" xmlns="" w="9525">
+                  <a14:hiddenLine xmlns="" xmlns:a14="http://schemas.microsoft.com/office/drawing/2010/main" w="9525">
                     <a:solidFill>
                       <a:srgbClr val="000000"/>
                     </a:solidFill>
@@ -10573,7 +10574,7 @@
               </a:ln>
               <a:extLst>
                 <a:ext uri="{91240B29-F687-4f45-9708-019B960494DF}">
-                  <a14:hiddenLine xmlns:a14="http://schemas.microsoft.com/office/drawing/2010/main" xmlns="" w="9525">
+                  <a14:hiddenLine xmlns="" xmlns:a14="http://schemas.microsoft.com/office/drawing/2010/main" w="9525">
                     <a:solidFill>
                       <a:srgbClr val="000000"/>
                     </a:solidFill>
@@ -10635,7 +10636,7 @@
               </a:ln>
               <a:extLst>
                 <a:ext uri="{91240B29-F687-4f45-9708-019B960494DF}">
-                  <a14:hiddenLine xmlns:a14="http://schemas.microsoft.com/office/drawing/2010/main" xmlns="" w="9525">
+                  <a14:hiddenLine xmlns="" xmlns:a14="http://schemas.microsoft.com/office/drawing/2010/main" w="9525">
                     <a:solidFill>
                       <a:srgbClr val="000000"/>
                     </a:solidFill>
@@ -10725,7 +10726,7 @@
               </a:ln>
               <a:extLst>
                 <a:ext uri="{91240B29-F687-4f45-9708-019B960494DF}">
-                  <a14:hiddenLine xmlns:a14="http://schemas.microsoft.com/office/drawing/2010/main" xmlns="" w="9525">
+                  <a14:hiddenLine xmlns="" xmlns:a14="http://schemas.microsoft.com/office/drawing/2010/main" w="9525">
                     <a:solidFill>
                       <a:srgbClr val="000000"/>
                     </a:solidFill>
@@ -10815,7 +10816,7 @@
               </a:ln>
               <a:extLst>
                 <a:ext uri="{91240B29-F687-4f45-9708-019B960494DF}">
-                  <a14:hiddenLine xmlns:a14="http://schemas.microsoft.com/office/drawing/2010/main" xmlns="" w="9525">
+                  <a14:hiddenLine xmlns="" xmlns:a14="http://schemas.microsoft.com/office/drawing/2010/main" w="9525">
                     <a:solidFill>
                       <a:srgbClr val="000000"/>
                     </a:solidFill>
@@ -10880,7 +10881,7 @@
               </a:ln>
               <a:extLst>
                 <a:ext uri="{91240B29-F687-4f45-9708-019B960494DF}">
-                  <a14:hiddenLine xmlns:a14="http://schemas.microsoft.com/office/drawing/2010/main" xmlns="" w="9525">
+                  <a14:hiddenLine xmlns="" xmlns:a14="http://schemas.microsoft.com/office/drawing/2010/main" w="9525">
                     <a:solidFill>
                       <a:srgbClr val="000000"/>
                     </a:solidFill>
@@ -11000,7 +11001,7 @@
               </a:ln>
               <a:extLst>
                 <a:ext uri="{91240B29-F687-4f45-9708-019B960494DF}">
-                  <a14:hiddenLine xmlns:a14="http://schemas.microsoft.com/office/drawing/2010/main" xmlns="" w="9525">
+                  <a14:hiddenLine xmlns="" xmlns:a14="http://schemas.microsoft.com/office/drawing/2010/main" w="9525">
                     <a:solidFill>
                       <a:srgbClr val="000000"/>
                     </a:solidFill>
@@ -11098,7 +11099,7 @@
               </a:ln>
               <a:extLst>
                 <a:ext uri="{91240B29-F687-4f45-9708-019B960494DF}">
-                  <a14:hiddenLine xmlns:a14="http://schemas.microsoft.com/office/drawing/2010/main" xmlns="" w="9525">
+                  <a14:hiddenLine xmlns="" xmlns:a14="http://schemas.microsoft.com/office/drawing/2010/main" w="9525">
                     <a:solidFill>
                       <a:srgbClr val="000000"/>
                     </a:solidFill>
@@ -11213,7 +11214,7 @@
               </a:ln>
               <a:extLst>
                 <a:ext uri="{91240B29-F687-4f45-9708-019B960494DF}">
-                  <a14:hiddenLine xmlns:a14="http://schemas.microsoft.com/office/drawing/2010/main" xmlns="" w="9525">
+                  <a14:hiddenLine xmlns="" xmlns:a14="http://schemas.microsoft.com/office/drawing/2010/main" w="9525">
                     <a:solidFill>
                       <a:srgbClr val="000000"/>
                     </a:solidFill>
@@ -11303,7 +11304,7 @@
               </a:ln>
               <a:extLst>
                 <a:ext uri="{91240B29-F687-4f45-9708-019B960494DF}">
-                  <a14:hiddenLine xmlns:a14="http://schemas.microsoft.com/office/drawing/2010/main" xmlns="" w="9525">
+                  <a14:hiddenLine xmlns="" xmlns:a14="http://schemas.microsoft.com/office/drawing/2010/main" w="9525">
                     <a:solidFill>
                       <a:srgbClr val="000000"/>
                     </a:solidFill>
@@ -11368,7 +11369,7 @@
               </a:ln>
               <a:extLst>
                 <a:ext uri="{91240B29-F687-4f45-9708-019B960494DF}">
-                  <a14:hiddenLine xmlns:a14="http://schemas.microsoft.com/office/drawing/2010/main" xmlns="" w="9525">
+                  <a14:hiddenLine xmlns="" xmlns:a14="http://schemas.microsoft.com/office/drawing/2010/main" w="9525">
                     <a:solidFill>
                       <a:srgbClr val="000000"/>
                     </a:solidFill>
@@ -11458,7 +11459,7 @@
               </a:ln>
               <a:extLst>
                 <a:ext uri="{91240B29-F687-4f45-9708-019B960494DF}">
-                  <a14:hiddenLine xmlns:a14="http://schemas.microsoft.com/office/drawing/2010/main" xmlns="" w="9525">
+                  <a14:hiddenLine xmlns="" xmlns:a14="http://schemas.microsoft.com/office/drawing/2010/main" w="9525">
                     <a:solidFill>
                       <a:srgbClr val="000000"/>
                     </a:solidFill>
@@ -11526,7 +11527,7 @@
               </a:ln>
               <a:extLst>
                 <a:ext uri="{91240B29-F687-4f45-9708-019B960494DF}">
-                  <a14:hiddenLine xmlns:a14="http://schemas.microsoft.com/office/drawing/2010/main" xmlns="" w="9525">
+                  <a14:hiddenLine xmlns="" xmlns:a14="http://schemas.microsoft.com/office/drawing/2010/main" w="9525">
                     <a:solidFill>
                       <a:srgbClr val="000000"/>
                     </a:solidFill>
@@ -11616,7 +11617,7 @@
               </a:ln>
               <a:extLst>
                 <a:ext uri="{91240B29-F687-4f45-9708-019B960494DF}">
-                  <a14:hiddenLine xmlns:a14="http://schemas.microsoft.com/office/drawing/2010/main" xmlns="" w="9525">
+                  <a14:hiddenLine xmlns="" xmlns:a14="http://schemas.microsoft.com/office/drawing/2010/main" w="9525">
                     <a:solidFill>
                       <a:srgbClr val="000000"/>
                     </a:solidFill>
@@ -11684,7 +11685,7 @@
               </a:ln>
               <a:extLst>
                 <a:ext uri="{91240B29-F687-4f45-9708-019B960494DF}">
-                  <a14:hiddenLine xmlns:a14="http://schemas.microsoft.com/office/drawing/2010/main" xmlns="" w="9525">
+                  <a14:hiddenLine xmlns="" xmlns:a14="http://schemas.microsoft.com/office/drawing/2010/main" w="9525">
                     <a:solidFill>
                       <a:srgbClr val="000000"/>
                     </a:solidFill>
@@ -11774,7 +11775,7 @@
               </a:ln>
               <a:extLst>
                 <a:ext uri="{91240B29-F687-4f45-9708-019B960494DF}">
-                  <a14:hiddenLine xmlns:a14="http://schemas.microsoft.com/office/drawing/2010/main" xmlns="" w="9525">
+                  <a14:hiddenLine xmlns="" xmlns:a14="http://schemas.microsoft.com/office/drawing/2010/main" w="9525">
                     <a:solidFill>
                       <a:srgbClr val="000000"/>
                     </a:solidFill>
@@ -11808,7 +11809,7 @@
               </a:ln>
               <a:extLst>
                 <a:ext uri="{91240B29-F687-4f45-9708-019B960494DF}">
-                  <a14:hiddenLine xmlns:a14="http://schemas.microsoft.com/office/drawing/2010/main" xmlns="" w="9525">
+                  <a14:hiddenLine xmlns="" xmlns:a14="http://schemas.microsoft.com/office/drawing/2010/main" w="9525">
                     <a:solidFill>
                       <a:srgbClr val="000000"/>
                     </a:solidFill>
@@ -11949,7 +11950,7 @@
             <a:fld id="{48A87A34-81AB-432B-8DAE-1953F412C126}" type="datetimeFigureOut">
               <a:rPr lang="en-US" dirty="0"/>
               <a:pPr/>
-              <a:t>2/22/2022</a:t>
+              <a:t>3/21/2022</a:t>
             </a:fld>
             <a:endParaRPr lang="en-US" dirty="0"/>
           </a:p>
@@ -12764,7 +12765,7 @@
       </p:sp>
       <p:pic>
         <p:nvPicPr>
-          <p:cNvPr id="5" name="Picture 4"/>
+          <p:cNvPr id="3" name="Picture 2"/>
           <p:cNvPicPr>
             <a:picLocks noChangeAspect="1"/>
           </p:cNvPicPr>
@@ -12784,8 +12785,8 @@
         </p:blipFill>
         <p:spPr>
           <a:xfrm>
-            <a:off x="1003610" y="1735982"/>
-            <a:ext cx="10482959" cy="4731027"/>
+            <a:off x="956579" y="1349298"/>
+            <a:ext cx="10278841" cy="4638907"/>
           </a:xfrm>
           <a:prstGeom prst="rect">
             <a:avLst/>
@@ -12922,6 +12923,97 @@
       </p:grpSpPr>
       <p:sp>
         <p:nvSpPr>
+          <p:cNvPr id="2" name="Title 1"/>
+          <p:cNvSpPr>
+            <a:spLocks noGrp="1"/>
+          </p:cNvSpPr>
+          <p:nvPr>
+            <p:ph type="title"/>
+          </p:nvPr>
+        </p:nvSpPr>
+        <p:spPr>
+          <a:xfrm>
+            <a:off x="1681963" y="223023"/>
+            <a:ext cx="8298378" cy="822129"/>
+          </a:xfrm>
+        </p:spPr>
+        <p:txBody>
+          <a:bodyPr>
+            <a:normAutofit/>
+          </a:bodyPr>
+          <a:lstStyle/>
+          <a:p>
+            <a:pPr algn="ctr"/>
+            <a:r>
+              <a:rPr lang="en-US" sz="4000" dirty="0" smtClean="0"/>
+              <a:t>Security.org</a:t>
+            </a:r>
+            <a:endParaRPr lang="bg-BG" sz="4000" dirty="0"/>
+          </a:p>
+        </p:txBody>
+      </p:sp>
+      <p:pic>
+        <p:nvPicPr>
+          <p:cNvPr id="5" name="Picture 4"/>
+          <p:cNvPicPr>
+            <a:picLocks noChangeAspect="1"/>
+          </p:cNvPicPr>
+          <p:nvPr/>
+        </p:nvPicPr>
+        <p:blipFill>
+          <a:blip r:embed="rId2">
+            <a:extLst>
+              <a:ext uri="{28A0092B-C50C-407E-A947-70E740481C1C}">
+                <a14:useLocalDpi xmlns:a14="http://schemas.microsoft.com/office/drawing/2010/main" val="0"/>
+              </a:ext>
+            </a:extLst>
+          </a:blip>
+          <a:stretch>
+            <a:fillRect/>
+          </a:stretch>
+        </p:blipFill>
+        <p:spPr>
+          <a:xfrm>
+            <a:off x="1105829" y="1354901"/>
+            <a:ext cx="9980341" cy="4345053"/>
+          </a:xfrm>
+          <a:prstGeom prst="rect">
+            <a:avLst/>
+          </a:prstGeom>
+        </p:spPr>
+      </p:pic>
+    </p:spTree>
+    <p:extLst>
+      <p:ext uri="{BB962C8B-B14F-4D97-AF65-F5344CB8AC3E}">
+        <p14:creationId xmlns:p14="http://schemas.microsoft.com/office/powerpoint/2010/main" val="3476696892"/>
+      </p:ext>
+    </p:extLst>
+  </p:cSld>
+  <p:clrMapOvr>
+    <a:masterClrMapping/>
+  </p:clrMapOvr>
+</p:sld>
+</file>
+
+<file path=ppt/slides/slide7.xml><?xml version="1.0" encoding="utf-8"?>
+<p:sld xmlns:a="http://schemas.openxmlformats.org/drawingml/2006/main" xmlns:r="http://schemas.openxmlformats.org/officeDocument/2006/relationships" xmlns:p="http://schemas.openxmlformats.org/presentationml/2006/main">
+  <p:cSld>
+    <p:spTree>
+      <p:nvGrpSpPr>
+        <p:cNvPr id="1" name=""/>
+        <p:cNvGrpSpPr/>
+        <p:nvPr/>
+      </p:nvGrpSpPr>
+      <p:grpSpPr>
+        <a:xfrm>
+          <a:off x="0" y="0"/>
+          <a:ext cx="0" cy="0"/>
+          <a:chOff x="0" y="0"/>
+          <a:chExt cx="0" cy="0"/>
+        </a:xfrm>
+      </p:grpSpPr>
+      <p:sp>
+        <p:nvSpPr>
           <p:cNvPr id="6" name="Text Placeholder 5"/>
           <p:cNvSpPr>
             <a:spLocks noGrp="1"/>
@@ -12938,7 +13030,7 @@
         </p:spPr>
         <p:txBody>
           <a:bodyPr>
-            <a:normAutofit fontScale="92500"/>
+            <a:normAutofit fontScale="92500" lnSpcReduction="20000"/>
           </a:bodyPr>
           <a:lstStyle/>
           <a:p>
@@ -12950,7 +13042,31 @@
           <a:p>
             <a:r>
               <a:rPr lang="en-US" sz="2200" dirty="0" smtClean="0"/>
-              <a:t>App can generate different combinations of passwords simply by clicking the button “Generate…”. Users also can easily copy the generated password by clicking the button “Copy”. If end user feels that he doesn’t know what to do, user can click button “Help”. This will leads him to description.html. There he will get info about how to use this app.</a:t>
+              <a:t>App can generate different combinations of passwords simply by clicking the button “Generate…”. Users also can easily copy the generated password by clicking the button “Copy”. If end user feels that he doesn’t know what to do, user can click button “Help”. This will leads him to description.html. There he will get info about how to use this app</a:t>
+            </a:r>
+            <a:r>
+              <a:rPr lang="en-US" sz="2200" dirty="0" smtClean="0"/>
+              <a:t>.</a:t>
+            </a:r>
+            <a:r>
+              <a:rPr lang="bg-BG" sz="2200" dirty="0" smtClean="0"/>
+              <a:t> </a:t>
+            </a:r>
+          </a:p>
+          <a:p>
+            <a:r>
+              <a:rPr lang="en-US" sz="2200" dirty="0" smtClean="0"/>
+              <a:t>By clicking the button “Check password” the app leads you to </a:t>
+            </a:r>
+            <a:r>
+              <a:rPr lang="en-US" sz="2200" dirty="0" smtClean="0">
+                <a:hlinkClick r:id="rId2"/>
+              </a:rPr>
+              <a:t>www.security.org</a:t>
+            </a:r>
+            <a:r>
+              <a:rPr lang="en-US" sz="2200" dirty="0" smtClean="0"/>
+              <a:t> . On this site you can check the strength of your generated password.</a:t>
             </a:r>
             <a:endParaRPr lang="en-US" sz="2200" dirty="0"/>
           </a:p>
@@ -12968,7 +13084,7 @@
           <p:nvPr/>
         </p:nvPicPr>
         <p:blipFill>
-          <a:blip r:embed="rId2">
+          <a:blip r:embed="rId3">
             <a:extLst>
               <a:ext uri="{28A0092B-C50C-407E-A947-70E740481C1C}">
                 <a14:useLocalDpi xmlns:a14="http://schemas.microsoft.com/office/drawing/2010/main" val="0"/>
@@ -13009,7 +13125,7 @@
 </p:sld>
 </file>
 
-<file path=ppt/slides/slide7.xml><?xml version="1.0" encoding="utf-8"?>
+<file path=ppt/slides/slide8.xml><?xml version="1.0" encoding="utf-8"?>
 <p:sld xmlns:a="http://schemas.openxmlformats.org/drawingml/2006/main" xmlns:r="http://schemas.openxmlformats.org/officeDocument/2006/relationships" xmlns:p="http://schemas.openxmlformats.org/presentationml/2006/main">
   <p:cSld>
     <p:spTree>
@@ -13050,12 +13166,8 @@
           <a:p>
             <a:pPr algn="ctr"/>
             <a:r>
-              <a:rPr lang="en-US" sz="4800" dirty="0" err="1" smtClean="0"/>
-              <a:t>THANk</a:t>
-            </a:r>
-            <a:r>
               <a:rPr lang="en-US" sz="4800" dirty="0" smtClean="0"/>
-              <a:t> you and goodbye!</a:t>
+              <a:t>THANk you and goodbye!</a:t>
             </a:r>
             <a:endParaRPr lang="bg-BG" sz="4800" dirty="0"/>
           </a:p>

</xml_diff>